<commit_message>
readded accidentally deleted feature of writing to txt
</commit_message>
<xml_diff>
--- a/Y9 INV 2 – Sampling & Distribution.pptx
+++ b/Y9 INV 2 – Sampling & Distribution.pptx
@@ -143,7 +143,7 @@
 <file path=ppt/revisionInfo.xml><?xml version="1.0" encoding="utf-8"?>
 <p1510:revInfo xmlns:a="http://schemas.openxmlformats.org/drawingml/2006/main" xmlns:r="http://schemas.openxmlformats.org/officeDocument/2006/relationships" xmlns:p1510="http://schemas.microsoft.com/office/powerpoint/2015/10/main">
   <p1510:revLst>
-    <p1510:client id="{FFA5B825-F6B6-4659-B16B-1BFC8771DB5C}" v="1" dt="2025-10-21T01:04:45.005"/>
+    <p1510:client id="{FFA5B825-F6B6-4659-B16B-1BFC8771DB5C}" v="3" dt="2025-10-22T13:58:38.545"/>
   </p1510:revLst>
 </p1510:revInfo>
 </file>
@@ -1088,14 +1088,6 @@
             <ac:spMk id="3" creationId="{3E858C81-017E-EDD7-F449-F0F569BE86E2}"/>
           </ac:spMkLst>
         </pc:spChg>
-        <pc:picChg chg="add mod">
-          <ac:chgData name="SUN Henry" userId="ad28bb31-feec-467e-aba8-a9c658208cdf" providerId="ADAL" clId="{31157CF8-0C1B-4D30-8FF3-36092DCFD3FF}" dt="2025-10-19T03:34:35.881" v="8603" actId="1076"/>
-          <ac:picMkLst>
-            <pc:docMk/>
-            <pc:sldMk cId="1178790836" sldId="281"/>
-            <ac:picMk id="5" creationId="{B3F2974D-7437-8277-2AAD-EEE0DBFD381C}"/>
-          </ac:picMkLst>
-        </pc:picChg>
       </pc:sldChg>
       <pc:sldChg chg="addSp delSp modSp new mod">
         <pc:chgData name="SUN Henry" userId="ad28bb31-feec-467e-aba8-a9c658208cdf" providerId="ADAL" clId="{31157CF8-0C1B-4D30-8FF3-36092DCFD3FF}" dt="2025-10-19T03:59:07.290" v="9107" actId="207"/>
@@ -1135,14 +1127,6 @@
             <ac:picMk id="14" creationId="{01D6A709-7947-FFA2-CBE3-AF3A5D97FC3F}"/>
           </ac:picMkLst>
         </pc:picChg>
-        <pc:picChg chg="add mod">
-          <ac:chgData name="SUN Henry" userId="ad28bb31-feec-467e-aba8-a9c658208cdf" providerId="ADAL" clId="{31157CF8-0C1B-4D30-8FF3-36092DCFD3FF}" dt="2025-10-19T03:53:10.376" v="8712" actId="14100"/>
-          <ac:picMkLst>
-            <pc:docMk/>
-            <pc:sldMk cId="3269705666" sldId="282"/>
-            <ac:picMk id="17" creationId="{956694A4-C45E-D938-9892-EC75D40FDDAD}"/>
-          </ac:picMkLst>
-        </pc:picChg>
       </pc:sldChg>
       <pc:sldChg chg="addSp delSp modSp new mod">
         <pc:chgData name="SUN Henry" userId="ad28bb31-feec-467e-aba8-a9c658208cdf" providerId="ADAL" clId="{31157CF8-0C1B-4D30-8FF3-36092DCFD3FF}" dt="2025-10-19T03:58:33.418" v="9102" actId="207"/>
@@ -1172,14 +1156,6 @@
             <pc:docMk/>
             <pc:sldMk cId="1526350303" sldId="283"/>
             <ac:picMk id="9" creationId="{6970B728-1A8D-970A-15B8-3C3F5FA8A475}"/>
-          </ac:picMkLst>
-        </pc:picChg>
-        <pc:picChg chg="add mod">
-          <ac:chgData name="SUN Henry" userId="ad28bb31-feec-467e-aba8-a9c658208cdf" providerId="ADAL" clId="{31157CF8-0C1B-4D30-8FF3-36092DCFD3FF}" dt="2025-10-19T03:56:56.791" v="8955" actId="14100"/>
-          <ac:picMkLst>
-            <pc:docMk/>
-            <pc:sldMk cId="1526350303" sldId="283"/>
-            <ac:picMk id="11" creationId="{47C88255-251C-DD90-5E39-C7A1D87B830B}"/>
           </ac:picMkLst>
         </pc:picChg>
       </pc:sldChg>
@@ -1218,7 +1194,7 @@
   <pc:docChgLst>
     <pc:chgData name="SUN Henry" userId="ad28bb31-feec-467e-aba8-a9c658208cdf" providerId="ADAL" clId="{DC21DE38-9BA3-4502-9935-F68E1589427E}"/>
     <pc:docChg chg="custSel modSld">
-      <pc:chgData name="SUN Henry" userId="ad28bb31-feec-467e-aba8-a9c658208cdf" providerId="ADAL" clId="{DC21DE38-9BA3-4502-9935-F68E1589427E}" dt="2025-10-21T01:36:47.837" v="134" actId="1076"/>
+      <pc:chgData name="SUN Henry" userId="ad28bb31-feec-467e-aba8-a9c658208cdf" providerId="ADAL" clId="{DC21DE38-9BA3-4502-9935-F68E1589427E}" dt="2025-10-22T13:58:45.435" v="173" actId="1076"/>
       <pc:docMkLst>
         <pc:docMk/>
       </pc:docMkLst>
@@ -1283,6 +1259,131 @@
           </ac:picMkLst>
         </pc:picChg>
       </pc:sldChg>
+      <pc:sldChg chg="addSp delSp modSp mod">
+        <pc:chgData name="SUN Henry" userId="ad28bb31-feec-467e-aba8-a9c658208cdf" providerId="ADAL" clId="{DC21DE38-9BA3-4502-9935-F68E1589427E}" dt="2025-10-22T13:55:56.244" v="160" actId="20577"/>
+        <pc:sldMkLst>
+          <pc:docMk/>
+          <pc:sldMk cId="1178790836" sldId="281"/>
+        </pc:sldMkLst>
+        <pc:spChg chg="mod">
+          <ac:chgData name="SUN Henry" userId="ad28bb31-feec-467e-aba8-a9c658208cdf" providerId="ADAL" clId="{DC21DE38-9BA3-4502-9935-F68E1589427E}" dt="2025-10-22T13:55:56.244" v="160" actId="20577"/>
+          <ac:spMkLst>
+            <pc:docMk/>
+            <pc:sldMk cId="1178790836" sldId="281"/>
+            <ac:spMk id="3" creationId="{3E858C81-017E-EDD7-F449-F0F569BE86E2}"/>
+          </ac:spMkLst>
+        </pc:spChg>
+        <pc:picChg chg="del">
+          <ac:chgData name="SUN Henry" userId="ad28bb31-feec-467e-aba8-a9c658208cdf" providerId="ADAL" clId="{DC21DE38-9BA3-4502-9935-F68E1589427E}" dt="2025-10-22T13:52:13.194" v="145" actId="478"/>
+          <ac:picMkLst>
+            <pc:docMk/>
+            <pc:sldMk cId="1178790836" sldId="281"/>
+            <ac:picMk id="5" creationId="{B3F2974D-7437-8277-2AAD-EEE0DBFD381C}"/>
+          </ac:picMkLst>
+        </pc:picChg>
+        <pc:picChg chg="add del mod">
+          <ac:chgData name="SUN Henry" userId="ad28bb31-feec-467e-aba8-a9c658208cdf" providerId="ADAL" clId="{DC21DE38-9BA3-4502-9935-F68E1589427E}" dt="2025-10-22T13:55:44.058" v="150" actId="478"/>
+          <ac:picMkLst>
+            <pc:docMk/>
+            <pc:sldMk cId="1178790836" sldId="281"/>
+            <ac:picMk id="6" creationId="{AD61D553-D2AD-6F41-4D45-9F93C0A1085C}"/>
+          </ac:picMkLst>
+        </pc:picChg>
+        <pc:picChg chg="add mod">
+          <ac:chgData name="SUN Henry" userId="ad28bb31-feec-467e-aba8-a9c658208cdf" providerId="ADAL" clId="{DC21DE38-9BA3-4502-9935-F68E1589427E}" dt="2025-10-22T13:55:49.989" v="153" actId="1076"/>
+          <ac:picMkLst>
+            <pc:docMk/>
+            <pc:sldMk cId="1178790836" sldId="281"/>
+            <ac:picMk id="8" creationId="{190819FC-E3E4-3423-EE5F-0E641C7349EC}"/>
+          </ac:picMkLst>
+        </pc:picChg>
+      </pc:sldChg>
+      <pc:sldChg chg="addSp delSp modSp mod">
+        <pc:chgData name="SUN Henry" userId="ad28bb31-feec-467e-aba8-a9c658208cdf" providerId="ADAL" clId="{DC21DE38-9BA3-4502-9935-F68E1589427E}" dt="2025-10-22T13:58:10.297" v="167" actId="1076"/>
+        <pc:sldMkLst>
+          <pc:docMk/>
+          <pc:sldMk cId="3269705666" sldId="282"/>
+        </pc:sldMkLst>
+        <pc:graphicFrameChg chg="mod">
+          <ac:chgData name="SUN Henry" userId="ad28bb31-feec-467e-aba8-a9c658208cdf" providerId="ADAL" clId="{DC21DE38-9BA3-4502-9935-F68E1589427E}" dt="2025-10-22T13:58:10.297" v="167" actId="1076"/>
+          <ac:graphicFrameMkLst>
+            <pc:docMk/>
+            <pc:sldMk cId="3269705666" sldId="282"/>
+            <ac:graphicFrameMk id="15" creationId="{151D2442-3476-B0ED-F336-07288ACA0880}"/>
+          </ac:graphicFrameMkLst>
+        </pc:graphicFrameChg>
+        <pc:picChg chg="add mod">
+          <ac:chgData name="SUN Henry" userId="ad28bb31-feec-467e-aba8-a9c658208cdf" providerId="ADAL" clId="{DC21DE38-9BA3-4502-9935-F68E1589427E}" dt="2025-10-22T13:50:55.666" v="139" actId="14100"/>
+          <ac:picMkLst>
+            <pc:docMk/>
+            <pc:sldMk cId="3269705666" sldId="282"/>
+            <ac:picMk id="4" creationId="{2B695A77-7150-BDE2-2845-F43F99C2D22C}"/>
+          </ac:picMkLst>
+        </pc:picChg>
+        <pc:picChg chg="add mod">
+          <ac:chgData name="SUN Henry" userId="ad28bb31-feec-467e-aba8-a9c658208cdf" providerId="ADAL" clId="{DC21DE38-9BA3-4502-9935-F68E1589427E}" dt="2025-10-22T13:58:08.828" v="166" actId="962"/>
+          <ac:picMkLst>
+            <pc:docMk/>
+            <pc:sldMk cId="3269705666" sldId="282"/>
+            <ac:picMk id="6" creationId="{26F5AD67-D05B-393D-7684-023195D5717D}"/>
+          </ac:picMkLst>
+        </pc:picChg>
+        <pc:picChg chg="del">
+          <ac:chgData name="SUN Henry" userId="ad28bb31-feec-467e-aba8-a9c658208cdf" providerId="ADAL" clId="{DC21DE38-9BA3-4502-9935-F68E1589427E}" dt="2025-10-22T13:57:26.343" v="161" actId="478"/>
+          <ac:picMkLst>
+            <pc:docMk/>
+            <pc:sldMk cId="3269705666" sldId="282"/>
+            <ac:picMk id="14" creationId="{01D6A709-7947-FFA2-CBE3-AF3A5D97FC3F}"/>
+          </ac:picMkLst>
+        </pc:picChg>
+        <pc:picChg chg="del">
+          <ac:chgData name="SUN Henry" userId="ad28bb31-feec-467e-aba8-a9c658208cdf" providerId="ADAL" clId="{DC21DE38-9BA3-4502-9935-F68E1589427E}" dt="2025-10-22T13:50:41.960" v="135" actId="478"/>
+          <ac:picMkLst>
+            <pc:docMk/>
+            <pc:sldMk cId="3269705666" sldId="282"/>
+            <ac:picMk id="17" creationId="{956694A4-C45E-D938-9892-EC75D40FDDAD}"/>
+          </ac:picMkLst>
+        </pc:picChg>
+      </pc:sldChg>
+      <pc:sldChg chg="addSp delSp modSp mod">
+        <pc:chgData name="SUN Henry" userId="ad28bb31-feec-467e-aba8-a9c658208cdf" providerId="ADAL" clId="{DC21DE38-9BA3-4502-9935-F68E1589427E}" dt="2025-10-22T13:58:45.435" v="173" actId="1076"/>
+        <pc:sldMkLst>
+          <pc:docMk/>
+          <pc:sldMk cId="1526350303" sldId="283"/>
+        </pc:sldMkLst>
+        <pc:picChg chg="add mod">
+          <ac:chgData name="SUN Henry" userId="ad28bb31-feec-467e-aba8-a9c658208cdf" providerId="ADAL" clId="{DC21DE38-9BA3-4502-9935-F68E1589427E}" dt="2025-10-22T13:51:32.423" v="143" actId="1076"/>
+          <ac:picMkLst>
+            <pc:docMk/>
+            <pc:sldMk cId="1526350303" sldId="283"/>
+            <ac:picMk id="5" creationId="{28CFF049-5B84-6C48-01B8-E6F711560F40}"/>
+          </ac:picMkLst>
+        </pc:picChg>
+        <pc:picChg chg="add mod">
+          <ac:chgData name="SUN Henry" userId="ad28bb31-feec-467e-aba8-a9c658208cdf" providerId="ADAL" clId="{DC21DE38-9BA3-4502-9935-F68E1589427E}" dt="2025-10-22T13:58:45.435" v="173" actId="1076"/>
+          <ac:picMkLst>
+            <pc:docMk/>
+            <pc:sldMk cId="1526350303" sldId="283"/>
+            <ac:picMk id="7" creationId="{7465414F-2E79-82BC-0148-D9AA0653CC60}"/>
+          </ac:picMkLst>
+        </pc:picChg>
+        <pc:picChg chg="del mod">
+          <ac:chgData name="SUN Henry" userId="ad28bb31-feec-467e-aba8-a9c658208cdf" providerId="ADAL" clId="{DC21DE38-9BA3-4502-9935-F68E1589427E}" dt="2025-10-22T13:58:13.349" v="168" actId="478"/>
+          <ac:picMkLst>
+            <pc:docMk/>
+            <pc:sldMk cId="1526350303" sldId="283"/>
+            <ac:picMk id="9" creationId="{6970B728-1A8D-970A-15B8-3C3F5FA8A475}"/>
+          </ac:picMkLst>
+        </pc:picChg>
+        <pc:picChg chg="del">
+          <ac:chgData name="SUN Henry" userId="ad28bb31-feec-467e-aba8-a9c658208cdf" providerId="ADAL" clId="{DC21DE38-9BA3-4502-9935-F68E1589427E}" dt="2025-10-22T13:51:23.465" v="140" actId="478"/>
+          <ac:picMkLst>
+            <pc:docMk/>
+            <pc:sldMk cId="1526350303" sldId="283"/>
+            <ac:picMk id="11" creationId="{47C88255-251C-DD90-5E39-C7A1D87B830B}"/>
+          </ac:picMkLst>
+        </pc:picChg>
+      </pc:sldChg>
     </pc:docChg>
   </pc:docChgLst>
 </pc:chgInfo>
@@ -1474,7 +1575,7 @@
           <a:p>
             <a:fld id="{0B4F84E5-4AB8-40D3-AC38-56156A8D300D}" type="datetimeFigureOut">
               <a:rPr lang="en-AU" smtClean="0"/>
-              <a:t>21/10/2025</a:t>
+              <a:t>22/10/2025</a:t>
             </a:fld>
             <a:endParaRPr lang="en-AU"/>
           </a:p>
@@ -1749,7 +1850,7 @@
           <a:p>
             <a:fld id="{0B4F84E5-4AB8-40D3-AC38-56156A8D300D}" type="datetimeFigureOut">
               <a:rPr lang="en-AU" smtClean="0"/>
-              <a:t>21/10/2025</a:t>
+              <a:t>22/10/2025</a:t>
             </a:fld>
             <a:endParaRPr lang="en-AU"/>
           </a:p>
@@ -1943,7 +2044,7 @@
           <a:p>
             <a:fld id="{0B4F84E5-4AB8-40D3-AC38-56156A8D300D}" type="datetimeFigureOut">
               <a:rPr lang="en-AU" smtClean="0"/>
-              <a:t>21/10/2025</a:t>
+              <a:t>22/10/2025</a:t>
             </a:fld>
             <a:endParaRPr lang="en-AU"/>
           </a:p>
@@ -2216,7 +2317,7 @@
           <a:p>
             <a:fld id="{0B4F84E5-4AB8-40D3-AC38-56156A8D300D}" type="datetimeFigureOut">
               <a:rPr lang="en-AU" smtClean="0"/>
-              <a:t>21/10/2025</a:t>
+              <a:t>22/10/2025</a:t>
             </a:fld>
             <a:endParaRPr lang="en-AU"/>
           </a:p>
@@ -2557,7 +2658,7 @@
           <a:p>
             <a:fld id="{0B4F84E5-4AB8-40D3-AC38-56156A8D300D}" type="datetimeFigureOut">
               <a:rPr lang="en-AU" smtClean="0"/>
-              <a:t>21/10/2025</a:t>
+              <a:t>22/10/2025</a:t>
             </a:fld>
             <a:endParaRPr lang="en-AU"/>
           </a:p>
@@ -3180,7 +3281,7 @@
           <a:p>
             <a:fld id="{0B4F84E5-4AB8-40D3-AC38-56156A8D300D}" type="datetimeFigureOut">
               <a:rPr lang="en-AU" smtClean="0"/>
-              <a:t>21/10/2025</a:t>
+              <a:t>22/10/2025</a:t>
             </a:fld>
             <a:endParaRPr lang="en-AU"/>
           </a:p>
@@ -4040,7 +4141,7 @@
           <a:p>
             <a:fld id="{0B4F84E5-4AB8-40D3-AC38-56156A8D300D}" type="datetimeFigureOut">
               <a:rPr lang="en-AU" smtClean="0"/>
-              <a:t>21/10/2025</a:t>
+              <a:t>22/10/2025</a:t>
             </a:fld>
             <a:endParaRPr lang="en-AU"/>
           </a:p>
@@ -4210,7 +4311,7 @@
           <a:p>
             <a:fld id="{0B4F84E5-4AB8-40D3-AC38-56156A8D300D}" type="datetimeFigureOut">
               <a:rPr lang="en-AU" smtClean="0"/>
-              <a:t>21/10/2025</a:t>
+              <a:t>22/10/2025</a:t>
             </a:fld>
             <a:endParaRPr lang="en-AU"/>
           </a:p>
@@ -4390,7 +4491,7 @@
           <a:p>
             <a:fld id="{0B4F84E5-4AB8-40D3-AC38-56156A8D300D}" type="datetimeFigureOut">
               <a:rPr lang="en-AU" smtClean="0"/>
-              <a:t>21/10/2025</a:t>
+              <a:t>22/10/2025</a:t>
             </a:fld>
             <a:endParaRPr lang="en-AU"/>
           </a:p>
@@ -4560,7 +4661,7 @@
           <a:p>
             <a:fld id="{0B4F84E5-4AB8-40D3-AC38-56156A8D300D}" type="datetimeFigureOut">
               <a:rPr lang="en-AU" smtClean="0"/>
-              <a:t>21/10/2025</a:t>
+              <a:t>22/10/2025</a:t>
             </a:fld>
             <a:endParaRPr lang="en-AU"/>
           </a:p>
@@ -4807,7 +4908,7 @@
           <a:p>
             <a:fld id="{0B4F84E5-4AB8-40D3-AC38-56156A8D300D}" type="datetimeFigureOut">
               <a:rPr lang="en-AU" smtClean="0"/>
-              <a:t>21/10/2025</a:t>
+              <a:t>22/10/2025</a:t>
             </a:fld>
             <a:endParaRPr lang="en-AU"/>
           </a:p>
@@ -5099,7 +5200,7 @@
           <a:p>
             <a:fld id="{0B4F84E5-4AB8-40D3-AC38-56156A8D300D}" type="datetimeFigureOut">
               <a:rPr lang="en-AU" smtClean="0"/>
-              <a:t>21/10/2025</a:t>
+              <a:t>22/10/2025</a:t>
             </a:fld>
             <a:endParaRPr lang="en-AU"/>
           </a:p>
@@ -5543,7 +5644,7 @@
           <a:p>
             <a:fld id="{0B4F84E5-4AB8-40D3-AC38-56156A8D300D}" type="datetimeFigureOut">
               <a:rPr lang="en-AU" smtClean="0"/>
-              <a:t>21/10/2025</a:t>
+              <a:t>22/10/2025</a:t>
             </a:fld>
             <a:endParaRPr lang="en-AU"/>
           </a:p>
@@ -5661,7 +5762,7 @@
           <a:p>
             <a:fld id="{0B4F84E5-4AB8-40D3-AC38-56156A8D300D}" type="datetimeFigureOut">
               <a:rPr lang="en-AU" smtClean="0"/>
-              <a:t>21/10/2025</a:t>
+              <a:t>22/10/2025</a:t>
             </a:fld>
             <a:endParaRPr lang="en-AU"/>
           </a:p>
@@ -5756,7 +5857,7 @@
           <a:p>
             <a:fld id="{0B4F84E5-4AB8-40D3-AC38-56156A8D300D}" type="datetimeFigureOut">
               <a:rPr lang="en-AU" smtClean="0"/>
-              <a:t>21/10/2025</a:t>
+              <a:t>22/10/2025</a:t>
             </a:fld>
             <a:endParaRPr lang="en-AU"/>
           </a:p>
@@ -6035,7 +6136,7 @@
           <a:p>
             <a:fld id="{0B4F84E5-4AB8-40D3-AC38-56156A8D300D}" type="datetimeFigureOut">
               <a:rPr lang="en-AU" smtClean="0"/>
-              <a:t>21/10/2025</a:t>
+              <a:t>22/10/2025</a:t>
             </a:fld>
             <a:endParaRPr lang="en-AU"/>
           </a:p>
@@ -6310,7 +6411,7 @@
           <a:p>
             <a:fld id="{0B4F84E5-4AB8-40D3-AC38-56156A8D300D}" type="datetimeFigureOut">
               <a:rPr lang="en-AU" smtClean="0"/>
-              <a:t>21/10/2025</a:t>
+              <a:t>22/10/2025</a:t>
             </a:fld>
             <a:endParaRPr lang="en-AU"/>
           </a:p>
@@ -6753,7 +6854,7 @@
           <a:p>
             <a:fld id="{0B4F84E5-4AB8-40D3-AC38-56156A8D300D}" type="datetimeFigureOut">
               <a:rPr lang="en-AU" smtClean="0"/>
-              <a:t>21/10/2025</a:t>
+              <a:t>22/10/2025</a:t>
             </a:fld>
             <a:endParaRPr lang="en-AU"/>
           </a:p>
@@ -11777,8 +11878,8 @@
         </p:nvSpPr>
         <p:spPr>
           <a:xfrm>
-            <a:off x="1136840" y="1577430"/>
-            <a:ext cx="8946541" cy="4195481"/>
+            <a:off x="1136841" y="1577430"/>
+            <a:ext cx="5517960" cy="4195481"/>
           </a:xfrm>
         </p:spPr>
         <p:txBody>
@@ -11846,17 +11947,17 @@
               <a:rPr lang="en-AU" dirty="0">
                 <a:latin typeface="Consolas" panose="020B0609020204030204" pitchFamily="49" charset="0"/>
               </a:rPr>
-              <a:t>The results are also written into a txt document</a:t>
+              <a:t>The results are also written into a txt file</a:t>
             </a:r>
           </a:p>
         </p:txBody>
       </p:sp>
       <p:pic>
         <p:nvPicPr>
-          <p:cNvPr id="5" name="Picture 4">
+          <p:cNvPr id="8" name="Picture 7">
             <a:extLst>
               <a:ext uri="{FF2B5EF4-FFF2-40B4-BE49-F238E27FC236}">
-                <a16:creationId xmlns:a16="http://schemas.microsoft.com/office/drawing/2014/main" id="{B3F2974D-7437-8277-2AAD-EEE0DBFD381C}"/>
+                <a16:creationId xmlns:a16="http://schemas.microsoft.com/office/drawing/2014/main" id="{190819FC-E3E4-3423-EE5F-0E641C7349EC}"/>
               </a:ext>
             </a:extLst>
           </p:cNvPr>
@@ -11873,8 +11974,8 @@
         </p:blipFill>
         <p:spPr>
           <a:xfrm>
-            <a:off x="1136840" y="3985594"/>
-            <a:ext cx="7611537" cy="2419688"/>
+            <a:off x="6942994" y="2767503"/>
+            <a:ext cx="4919637" cy="3761439"/>
           </a:xfrm>
           <a:prstGeom prst="rect">
             <a:avLst/>
@@ -12037,42 +12138,6 @@
           </a:p>
         </p:txBody>
       </p:sp>
-      <p:pic>
-        <p:nvPicPr>
-          <p:cNvPr id="14" name="Picture 13" descr="A graph of a graph&#10;&#10;AI-generated content may be incorrect.">
-            <a:extLst>
-              <a:ext uri="{FF2B5EF4-FFF2-40B4-BE49-F238E27FC236}">
-                <a16:creationId xmlns:a16="http://schemas.microsoft.com/office/drawing/2014/main" id="{01D6A709-7947-FFA2-CBE3-AF3A5D97FC3F}"/>
-              </a:ext>
-            </a:extLst>
-          </p:cNvPr>
-          <p:cNvPicPr>
-            <a:picLocks noChangeAspect="1"/>
-          </p:cNvPicPr>
-          <p:nvPr/>
-        </p:nvPicPr>
-        <p:blipFill>
-          <a:blip r:embed="rId2">
-            <a:extLst>
-              <a:ext uri="{28A0092B-C50C-407E-A947-70E740481C1C}">
-                <a14:useLocalDpi xmlns:a14="http://schemas.microsoft.com/office/drawing/2010/main" val="0"/>
-              </a:ext>
-            </a:extLst>
-          </a:blip>
-          <a:stretch>
-            <a:fillRect/>
-          </a:stretch>
-        </p:blipFill>
-        <p:spPr>
-          <a:xfrm>
-            <a:off x="6199939" y="3820813"/>
-            <a:ext cx="6011233" cy="3027532"/>
-          </a:xfrm>
-          <a:prstGeom prst="rect">
-            <a:avLst/>
-          </a:prstGeom>
-        </p:spPr>
-      </p:pic>
       <p:graphicFrame>
         <p:nvGraphicFramePr>
           <p:cNvPr id="15" name="Object 14">
@@ -12088,25 +12153,25 @@
           <p:nvPr>
             <p:extLst>
               <p:ext uri="{D42A27DB-BD31-4B8C-83A1-F6EECF244321}">
-                <p14:modId xmlns:p14="http://schemas.microsoft.com/office/powerpoint/2010/main" val="2669803818"/>
+                <p14:modId xmlns:p14="http://schemas.microsoft.com/office/powerpoint/2010/main" val="843530322"/>
               </p:ext>
             </p:extLst>
           </p:nvPr>
         </p:nvGraphicFramePr>
         <p:xfrm>
-          <a:off x="9717399" y="2638350"/>
+          <a:off x="9717398" y="2214787"/>
           <a:ext cx="2028825" cy="514350"/>
         </p:xfrm>
         <a:graphic>
           <a:graphicData uri="http://schemas.openxmlformats.org/presentationml/2006/ole">
             <mc:AlternateContent xmlns:mc="http://schemas.openxmlformats.org/markup-compatibility/2006">
               <mc:Choice xmlns:v="urn:schemas-microsoft-com:vml" Requires="v">
-                <p:oleObj name="Packager Shell Object" showAsIcon="1" r:id="rId3" imgW="2028806" imgH="514350" progId="Package">
+                <p:oleObj name="Packager Shell Object" showAsIcon="1" r:id="rId2" imgW="2028806" imgH="514350" progId="Package">
                   <p:embed/>
                 </p:oleObj>
               </mc:Choice>
               <mc:Fallback>
-                <p:oleObj name="Packager Shell Object" showAsIcon="1" r:id="rId3" imgW="2028806" imgH="514350" progId="Package">
+                <p:oleObj name="Packager Shell Object" showAsIcon="1" r:id="rId2" imgW="2028806" imgH="514350" progId="Package">
                   <p:embed/>
                   <p:pic>
                     <p:nvPicPr>
@@ -12121,14 +12186,14 @@
                       <p:nvPr/>
                     </p:nvPicPr>
                     <p:blipFill>
-                      <a:blip r:embed="rId4"/>
+                      <a:blip r:embed="rId3"/>
                       <a:stretch>
                         <a:fillRect/>
                       </a:stretch>
                     </p:blipFill>
                     <p:spPr>
                       <a:xfrm>
-                        <a:off x="9717399" y="2638350"/>
+                        <a:off x="9717398" y="2214787"/>
                         <a:ext cx="2028825" cy="514350"/>
                       </a:xfrm>
                       <a:prstGeom prst="rect">
@@ -12144,10 +12209,10 @@
       </p:graphicFrame>
       <p:pic>
         <p:nvPicPr>
-          <p:cNvPr id="17" name="Picture 16">
+          <p:cNvPr id="4" name="Picture 3">
             <a:extLst>
               <a:ext uri="{FF2B5EF4-FFF2-40B4-BE49-F238E27FC236}">
-                <a16:creationId xmlns:a16="http://schemas.microsoft.com/office/drawing/2014/main" id="{956694A4-C45E-D938-9892-EC75D40FDDAD}"/>
+                <a16:creationId xmlns:a16="http://schemas.microsoft.com/office/drawing/2014/main" id="{2B695A77-7150-BDE2-2845-F43F99C2D22C}"/>
               </a:ext>
             </a:extLst>
           </p:cNvPr>
@@ -12157,15 +12222,51 @@
           <p:nvPr/>
         </p:nvPicPr>
         <p:blipFill>
-          <a:blip r:embed="rId5"/>
+          <a:blip r:embed="rId4"/>
           <a:stretch>
             <a:fillRect/>
           </a:stretch>
         </p:blipFill>
         <p:spPr>
           <a:xfrm>
-            <a:off x="0" y="3820813"/>
-            <a:ext cx="6610350" cy="3037188"/>
+            <a:off x="0" y="4442974"/>
+            <a:ext cx="6170945" cy="2405371"/>
+          </a:xfrm>
+          <a:prstGeom prst="rect">
+            <a:avLst/>
+          </a:prstGeom>
+        </p:spPr>
+      </p:pic>
+      <p:pic>
+        <p:nvPicPr>
+          <p:cNvPr id="6" name="Picture 5" descr="A graph of a number of trials needed&#10;&#10;AI-generated content may be incorrect.">
+            <a:extLst>
+              <a:ext uri="{FF2B5EF4-FFF2-40B4-BE49-F238E27FC236}">
+                <a16:creationId xmlns:a16="http://schemas.microsoft.com/office/drawing/2014/main" id="{26F5AD67-D05B-393D-7684-023195D5717D}"/>
+              </a:ext>
+            </a:extLst>
+          </p:cNvPr>
+          <p:cNvPicPr>
+            <a:picLocks noChangeAspect="1"/>
+          </p:cNvPicPr>
+          <p:nvPr/>
+        </p:nvPicPr>
+        <p:blipFill>
+          <a:blip r:embed="rId5">
+            <a:extLst>
+              <a:ext uri="{28A0092B-C50C-407E-A947-70E740481C1C}">
+                <a14:useLocalDpi xmlns:a14="http://schemas.microsoft.com/office/drawing/2010/main" val="0"/>
+              </a:ext>
+            </a:extLst>
+          </a:blip>
+          <a:stretch>
+            <a:fillRect/>
+          </a:stretch>
+        </p:blipFill>
+        <p:spPr>
+          <a:xfrm>
+            <a:off x="7221962" y="3090676"/>
+            <a:ext cx="4990873" cy="3743155"/>
           </a:xfrm>
           <a:prstGeom prst="rect">
             <a:avLst/>
@@ -12342,10 +12443,10 @@
       </p:sp>
       <p:pic>
         <p:nvPicPr>
-          <p:cNvPr id="9" name="Picture 8" descr="A graph of blue bars&#10;&#10;AI-generated content may be incorrect.">
+          <p:cNvPr id="5" name="Picture 4">
             <a:extLst>
               <a:ext uri="{FF2B5EF4-FFF2-40B4-BE49-F238E27FC236}">
-                <a16:creationId xmlns:a16="http://schemas.microsoft.com/office/drawing/2014/main" id="{6970B728-1A8D-970A-15B8-3C3F5FA8A475}"/>
+                <a16:creationId xmlns:a16="http://schemas.microsoft.com/office/drawing/2014/main" id="{28CFF049-5B84-6C48-01B8-E6F711560F40}"/>
               </a:ext>
             </a:extLst>
           </p:cNvPr>
@@ -12355,7 +12456,37 @@
           <p:nvPr/>
         </p:nvPicPr>
         <p:blipFill>
-          <a:blip r:embed="rId2">
+          <a:blip r:embed="rId2"/>
+          <a:stretch>
+            <a:fillRect/>
+          </a:stretch>
+        </p:blipFill>
+        <p:spPr>
+          <a:xfrm>
+            <a:off x="0" y="3349244"/>
+            <a:ext cx="5979167" cy="3508756"/>
+          </a:xfrm>
+          <a:prstGeom prst="rect">
+            <a:avLst/>
+          </a:prstGeom>
+        </p:spPr>
+      </p:pic>
+      <p:pic>
+        <p:nvPicPr>
+          <p:cNvPr id="7" name="Picture 6" descr="A graph of a graph&#10;&#10;AI-generated content may be incorrect.">
+            <a:extLst>
+              <a:ext uri="{FF2B5EF4-FFF2-40B4-BE49-F238E27FC236}">
+                <a16:creationId xmlns:a16="http://schemas.microsoft.com/office/drawing/2014/main" id="{7465414F-2E79-82BC-0148-D9AA0653CC60}"/>
+              </a:ext>
+            </a:extLst>
+          </p:cNvPr>
+          <p:cNvPicPr>
+            <a:picLocks noChangeAspect="1"/>
+          </p:cNvPicPr>
+          <p:nvPr/>
+        </p:nvPicPr>
+        <p:blipFill>
+          <a:blip r:embed="rId3">
             <a:extLst>
               <a:ext uri="{28A0092B-C50C-407E-A947-70E740481C1C}">
                 <a14:useLocalDpi xmlns:a14="http://schemas.microsoft.com/office/drawing/2010/main" val="0"/>
@@ -12368,38 +12499,8 @@
         </p:blipFill>
         <p:spPr>
           <a:xfrm>
-            <a:off x="5225287" y="3349244"/>
-            <a:ext cx="6966713" cy="3508756"/>
-          </a:xfrm>
-          <a:prstGeom prst="rect">
-            <a:avLst/>
-          </a:prstGeom>
-        </p:spPr>
-      </p:pic>
-      <p:pic>
-        <p:nvPicPr>
-          <p:cNvPr id="11" name="Picture 10">
-            <a:extLst>
-              <a:ext uri="{FF2B5EF4-FFF2-40B4-BE49-F238E27FC236}">
-                <a16:creationId xmlns:a16="http://schemas.microsoft.com/office/drawing/2014/main" id="{47C88255-251C-DD90-5E39-C7A1D87B830B}"/>
-              </a:ext>
-            </a:extLst>
-          </p:cNvPr>
-          <p:cNvPicPr>
-            <a:picLocks noChangeAspect="1"/>
-          </p:cNvPicPr>
-          <p:nvPr/>
-        </p:nvPicPr>
-        <p:blipFill>
-          <a:blip r:embed="rId3"/>
-          <a:stretch>
-            <a:fillRect/>
-          </a:stretch>
-        </p:blipFill>
-        <p:spPr>
-          <a:xfrm>
-            <a:off x="0" y="3349244"/>
-            <a:ext cx="5647021" cy="3486128"/>
+            <a:off x="5979167" y="3149600"/>
+            <a:ext cx="6309814" cy="3708400"/>
           </a:xfrm>
           <a:prstGeom prst="rect">
             <a:avLst/>

</xml_diff>